<commit_message>
major: note and exercise
</commit_message>
<xml_diff>
--- a/cm010_slides.pptx
+++ b/cm010_slides.pptx
@@ -10,8 +10,8 @@
   <p:sldIdLst>
     <p:sldId id="256" r:id="rId2"/>
     <p:sldId id="261" r:id="rId3"/>
-    <p:sldId id="257" r:id="rId4"/>
-    <p:sldId id="262" r:id="rId5"/>
+    <p:sldId id="262" r:id="rId4"/>
+    <p:sldId id="257" r:id="rId5"/>
     <p:sldId id="258" r:id="rId6"/>
     <p:sldId id="259" r:id="rId7"/>
     <p:sldId id="260" r:id="rId8"/>
@@ -629,7 +629,7 @@
     </p:spTree>
     <p:extLst>
       <p:ext uri="{BB962C8B-B14F-4D97-AF65-F5344CB8AC3E}">
-        <p14:creationId xmlns:p14="http://schemas.microsoft.com/office/powerpoint/2010/main" val="705510340"/>
+        <p14:creationId xmlns:p14="http://schemas.microsoft.com/office/powerpoint/2010/main" val="1407559756"/>
       </p:ext>
     </p:extLst>
   </p:cSld>
@@ -713,7 +713,7 @@
     </p:spTree>
     <p:extLst>
       <p:ext uri="{BB962C8B-B14F-4D97-AF65-F5344CB8AC3E}">
-        <p14:creationId xmlns:p14="http://schemas.microsoft.com/office/powerpoint/2010/main" val="1407559756"/>
+        <p14:creationId xmlns:p14="http://schemas.microsoft.com/office/powerpoint/2010/main" val="705510340"/>
       </p:ext>
     </p:extLst>
   </p:cSld>
@@ -4486,6 +4486,93 @@
           </a:p>
         </p:txBody>
       </p:sp>
+      <p:sp>
+        <p:nvSpPr>
+          <p:cNvPr id="3" name="Oval 2"/>
+          <p:cNvSpPr/>
+          <p:nvPr/>
+        </p:nvSpPr>
+        <p:spPr>
+          <a:xfrm>
+            <a:off x="5371973" y="2121433"/>
+            <a:ext cx="365149" cy="358173"/>
+          </a:xfrm>
+          <a:prstGeom prst="ellipse">
+            <a:avLst/>
+          </a:prstGeom>
+        </p:spPr>
+        <p:style>
+          <a:lnRef idx="2">
+            <a:schemeClr val="accent1">
+              <a:shade val="50000"/>
+            </a:schemeClr>
+          </a:lnRef>
+          <a:fillRef idx="1">
+            <a:schemeClr val="accent1"/>
+          </a:fillRef>
+          <a:effectRef idx="0">
+            <a:schemeClr val="accent1"/>
+          </a:effectRef>
+          <a:fontRef idx="minor">
+            <a:schemeClr val="lt1"/>
+          </a:fontRef>
+        </p:style>
+        <p:txBody>
+          <a:bodyPr rtlCol="0" anchor="ctr"/>
+          <a:lstStyle/>
+          <a:p>
+            <a:pPr algn="ctr"/>
+            <a:r>
+              <a:rPr lang="en-US" smtClean="0"/>
+              <a:t>1</a:t>
+            </a:r>
+            <a:endParaRPr lang="en-US"/>
+          </a:p>
+        </p:txBody>
+      </p:sp>
+      <p:sp>
+        <p:nvSpPr>
+          <p:cNvPr id="12" name="Oval 11"/>
+          <p:cNvSpPr/>
+          <p:nvPr/>
+        </p:nvSpPr>
+        <p:spPr>
+          <a:xfrm>
+            <a:off x="6005494" y="3002209"/>
+            <a:ext cx="365149" cy="358173"/>
+          </a:xfrm>
+          <a:prstGeom prst="ellipse">
+            <a:avLst/>
+          </a:prstGeom>
+        </p:spPr>
+        <p:style>
+          <a:lnRef idx="2">
+            <a:schemeClr val="accent1">
+              <a:shade val="50000"/>
+            </a:schemeClr>
+          </a:lnRef>
+          <a:fillRef idx="1">
+            <a:schemeClr val="accent1"/>
+          </a:fillRef>
+          <a:effectRef idx="0">
+            <a:schemeClr val="accent1"/>
+          </a:effectRef>
+          <a:fontRef idx="minor">
+            <a:schemeClr val="lt1"/>
+          </a:fontRef>
+        </p:style>
+        <p:txBody>
+          <a:bodyPr rtlCol="0" anchor="ctr"/>
+          <a:lstStyle/>
+          <a:p>
+            <a:pPr algn="ctr"/>
+            <a:r>
+              <a:rPr lang="en-US" dirty="0"/>
+              <a:t>2</a:t>
+            </a:r>
+          </a:p>
+        </p:txBody>
+      </p:sp>
     </p:spTree>
     <p:extLst>
       <p:ext uri="{BB962C8B-B14F-4D97-AF65-F5344CB8AC3E}">
@@ -4507,6 +4594,169 @@
 </file>
 
 <file path=ppt/slides/slide3.xml><?xml version="1.0" encoding="utf-8"?>
+<p:sld xmlns:a="http://schemas.openxmlformats.org/drawingml/2006/main" xmlns:r="http://schemas.openxmlformats.org/officeDocument/2006/relationships" xmlns:p="http://schemas.openxmlformats.org/presentationml/2006/main">
+  <p:cSld>
+    <p:spTree>
+      <p:nvGrpSpPr>
+        <p:cNvPr id="1" name=""/>
+        <p:cNvGrpSpPr/>
+        <p:nvPr/>
+      </p:nvGrpSpPr>
+      <p:grpSpPr>
+        <a:xfrm>
+          <a:off x="0" y="0"/>
+          <a:ext cx="0" cy="0"/>
+          <a:chOff x="0" y="0"/>
+          <a:chExt cx="0" cy="0"/>
+        </a:xfrm>
+      </p:grpSpPr>
+      <p:sp>
+        <p:nvSpPr>
+          <p:cNvPr id="5" name="TextBox 4"/>
+          <p:cNvSpPr txBox="1"/>
+          <p:nvPr/>
+        </p:nvSpPr>
+        <p:spPr>
+          <a:xfrm>
+            <a:off x="6026109" y="6453052"/>
+            <a:ext cx="1816010" cy="276999"/>
+          </a:xfrm>
+          <a:prstGeom prst="rect">
+            <a:avLst/>
+          </a:prstGeom>
+          <a:noFill/>
+        </p:spPr>
+        <p:txBody>
+          <a:bodyPr wrap="none" rtlCol="0">
+            <a:spAutoFit/>
+          </a:bodyPr>
+          <a:lstStyle/>
+          <a:p>
+            <a:r>
+              <a:rPr lang="en-US" sz="1200" dirty="0" smtClean="0"/>
+              <a:t>Source</a:t>
+            </a:r>
+            <a:r>
+              <a:rPr lang="en-US" sz="1200" dirty="0"/>
+              <a:t>: </a:t>
+            </a:r>
+            <a:r>
+              <a:rPr lang="en-US" sz="1200" dirty="0"/>
+              <a:t>R for Data </a:t>
+            </a:r>
+            <a:r>
+              <a:rPr lang="en-US" sz="1200" dirty="0" smtClean="0"/>
+              <a:t>Science</a:t>
+            </a:r>
+            <a:endParaRPr lang="en-US" sz="1200" dirty="0"/>
+          </a:p>
+        </p:txBody>
+      </p:sp>
+      <p:sp>
+        <p:nvSpPr>
+          <p:cNvPr id="6" name="TextBox 5"/>
+          <p:cNvSpPr txBox="1"/>
+          <p:nvPr/>
+        </p:nvSpPr>
+        <p:spPr>
+          <a:xfrm>
+            <a:off x="1823650" y="406690"/>
+            <a:ext cx="6079806" cy="584775"/>
+          </a:xfrm>
+          <a:prstGeom prst="rect">
+            <a:avLst/>
+          </a:prstGeom>
+          <a:noFill/>
+        </p:spPr>
+        <p:txBody>
+          <a:bodyPr wrap="none" rtlCol="0">
+            <a:spAutoFit/>
+          </a:bodyPr>
+          <a:lstStyle/>
+          <a:p>
+            <a:r>
+              <a:rPr lang="en-US" sz="3200" dirty="0" smtClean="0"/>
+              <a:t>Relational </a:t>
+            </a:r>
+            <a:r>
+              <a:rPr lang="en-US" sz="3200" dirty="0"/>
+              <a:t>data </a:t>
+            </a:r>
+            <a:r>
+              <a:rPr lang="en-US" sz="3200" dirty="0" smtClean="0"/>
+              <a:t>(</a:t>
+            </a:r>
+            <a:r>
+              <a:rPr lang="en-US" sz="3200" err="1" smtClean="0"/>
+              <a:t>e.g</a:t>
+            </a:r>
+            <a:r>
+              <a:rPr lang="en-US" sz="3200" smtClean="0"/>
+              <a:t>., `</a:t>
+            </a:r>
+            <a:r>
+              <a:rPr lang="en-US" sz="3200" i="1" smtClean="0"/>
+              <a:t>nycflights13`</a:t>
+            </a:r>
+            <a:r>
+              <a:rPr lang="en-US" sz="3200" smtClean="0"/>
+              <a:t>)</a:t>
+            </a:r>
+            <a:endParaRPr lang="en-US" sz="3200" dirty="0"/>
+          </a:p>
+        </p:txBody>
+      </p:sp>
+      <p:pic>
+        <p:nvPicPr>
+          <p:cNvPr id="2" name="Picture 1"/>
+          <p:cNvPicPr>
+            <a:picLocks noChangeAspect="1"/>
+          </p:cNvPicPr>
+          <p:nvPr/>
+        </p:nvPicPr>
+        <p:blipFill>
+          <a:blip r:embed="rId3">
+            <a:extLst>
+              <a:ext uri="{28A0092B-C50C-407E-A947-70E740481C1C}">
+                <a14:useLocalDpi xmlns:a14="http://schemas.microsoft.com/office/drawing/2010/main" val="0"/>
+              </a:ext>
+            </a:extLst>
+          </a:blip>
+          <a:stretch>
+            <a:fillRect/>
+          </a:stretch>
+        </p:blipFill>
+        <p:spPr>
+          <a:xfrm>
+            <a:off x="619432" y="1126581"/>
+            <a:ext cx="7998050" cy="5056239"/>
+          </a:xfrm>
+          <a:prstGeom prst="rect">
+            <a:avLst/>
+          </a:prstGeom>
+        </p:spPr>
+      </p:pic>
+    </p:spTree>
+    <p:extLst>
+      <p:ext uri="{BB962C8B-B14F-4D97-AF65-F5344CB8AC3E}">
+        <p14:creationId xmlns:p14="http://schemas.microsoft.com/office/powerpoint/2010/main" val="354143199"/>
+      </p:ext>
+    </p:extLst>
+  </p:cSld>
+  <p:clrMapOvr>
+    <a:masterClrMapping/>
+  </p:clrMapOvr>
+  <p:timing>
+    <p:tnLst>
+      <p:par>
+        <p:cTn id="1" dur="indefinite" restart="never" nodeType="tmRoot"/>
+      </p:par>
+    </p:tnLst>
+  </p:timing>
+</p:sld>
+</file>
+
+<file path=ppt/slides/slide4.xml><?xml version="1.0" encoding="utf-8"?>
 <p:sld xmlns:a="http://schemas.openxmlformats.org/drawingml/2006/main" xmlns:r="http://schemas.openxmlformats.org/officeDocument/2006/relationships" xmlns:p="http://schemas.openxmlformats.org/presentationml/2006/main">
   <p:cSld>
     <p:spTree>
@@ -4633,153 +4883,6 @@
     <p:extLst>
       <p:ext uri="{BB962C8B-B14F-4D97-AF65-F5344CB8AC3E}">
         <p14:creationId xmlns:p14="http://schemas.microsoft.com/office/powerpoint/2010/main" val="1304606030"/>
-      </p:ext>
-    </p:extLst>
-  </p:cSld>
-  <p:clrMapOvr>
-    <a:masterClrMapping/>
-  </p:clrMapOvr>
-  <p:timing>
-    <p:tnLst>
-      <p:par>
-        <p:cTn id="1" dur="indefinite" restart="never" nodeType="tmRoot"/>
-      </p:par>
-    </p:tnLst>
-  </p:timing>
-</p:sld>
-</file>
-
-<file path=ppt/slides/slide4.xml><?xml version="1.0" encoding="utf-8"?>
-<p:sld xmlns:a="http://schemas.openxmlformats.org/drawingml/2006/main" xmlns:r="http://schemas.openxmlformats.org/officeDocument/2006/relationships" xmlns:p="http://schemas.openxmlformats.org/presentationml/2006/main">
-  <p:cSld>
-    <p:spTree>
-      <p:nvGrpSpPr>
-        <p:cNvPr id="1" name=""/>
-        <p:cNvGrpSpPr/>
-        <p:nvPr/>
-      </p:nvGrpSpPr>
-      <p:grpSpPr>
-        <a:xfrm>
-          <a:off x="0" y="0"/>
-          <a:ext cx="0" cy="0"/>
-          <a:chOff x="0" y="0"/>
-          <a:chExt cx="0" cy="0"/>
-        </a:xfrm>
-      </p:grpSpPr>
-      <p:sp>
-        <p:nvSpPr>
-          <p:cNvPr id="5" name="TextBox 4"/>
-          <p:cNvSpPr txBox="1"/>
-          <p:nvPr/>
-        </p:nvSpPr>
-        <p:spPr>
-          <a:xfrm>
-            <a:off x="6026109" y="6453052"/>
-            <a:ext cx="1816010" cy="276999"/>
-          </a:xfrm>
-          <a:prstGeom prst="rect">
-            <a:avLst/>
-          </a:prstGeom>
-          <a:noFill/>
-        </p:spPr>
-        <p:txBody>
-          <a:bodyPr wrap="none" rtlCol="0">
-            <a:spAutoFit/>
-          </a:bodyPr>
-          <a:lstStyle/>
-          <a:p>
-            <a:r>
-              <a:rPr lang="en-US" sz="1200" dirty="0" smtClean="0"/>
-              <a:t>Source</a:t>
-            </a:r>
-            <a:r>
-              <a:rPr lang="en-US" sz="1200"/>
-              <a:t>: </a:t>
-            </a:r>
-            <a:r>
-              <a:rPr lang="en-US" sz="1200"/>
-              <a:t>R for </a:t>
-            </a:r>
-            <a:r>
-              <a:rPr lang="en-US" sz="1200"/>
-              <a:t>Data </a:t>
-            </a:r>
-            <a:r>
-              <a:rPr lang="en-US" sz="1200" smtClean="0"/>
-              <a:t>Science</a:t>
-            </a:r>
-            <a:endParaRPr lang="en-US" sz="1200"/>
-          </a:p>
-        </p:txBody>
-      </p:sp>
-      <p:sp>
-        <p:nvSpPr>
-          <p:cNvPr id="6" name="TextBox 5"/>
-          <p:cNvSpPr txBox="1"/>
-          <p:nvPr/>
-        </p:nvSpPr>
-        <p:spPr>
-          <a:xfrm>
-            <a:off x="2106455" y="406690"/>
-            <a:ext cx="5024004" cy="584775"/>
-          </a:xfrm>
-          <a:prstGeom prst="rect">
-            <a:avLst/>
-          </a:prstGeom>
-          <a:noFill/>
-        </p:spPr>
-        <p:txBody>
-          <a:bodyPr wrap="none" rtlCol="0">
-            <a:spAutoFit/>
-          </a:bodyPr>
-          <a:lstStyle/>
-          <a:p>
-            <a:r>
-              <a:rPr lang="en-US" sz="3200" dirty="0" smtClean="0"/>
-              <a:t>Relational </a:t>
-            </a:r>
-            <a:r>
-              <a:rPr lang="en-US" sz="3200" dirty="0"/>
-              <a:t>data (nycflights13)</a:t>
-            </a:r>
-            <a:endParaRPr lang="en-US" sz="3200" dirty="0"/>
-          </a:p>
-        </p:txBody>
-      </p:sp>
-      <p:pic>
-        <p:nvPicPr>
-          <p:cNvPr id="2" name="Picture 1"/>
-          <p:cNvPicPr>
-            <a:picLocks noChangeAspect="1"/>
-          </p:cNvPicPr>
-          <p:nvPr/>
-        </p:nvPicPr>
-        <p:blipFill>
-          <a:blip r:embed="rId3">
-            <a:extLst>
-              <a:ext uri="{28A0092B-C50C-407E-A947-70E740481C1C}">
-                <a14:useLocalDpi xmlns:a14="http://schemas.microsoft.com/office/drawing/2010/main" val="0"/>
-              </a:ext>
-            </a:extLst>
-          </a:blip>
-          <a:stretch>
-            <a:fillRect/>
-          </a:stretch>
-        </p:blipFill>
-        <p:spPr>
-          <a:xfrm>
-            <a:off x="619432" y="1126581"/>
-            <a:ext cx="7998050" cy="5056239"/>
-          </a:xfrm>
-          <a:prstGeom prst="rect">
-            <a:avLst/>
-          </a:prstGeom>
-        </p:spPr>
-      </p:pic>
-    </p:spTree>
-    <p:extLst>
-      <p:ext uri="{BB962C8B-B14F-4D97-AF65-F5344CB8AC3E}">
-        <p14:creationId xmlns:p14="http://schemas.microsoft.com/office/powerpoint/2010/main" val="354143199"/>
       </p:ext>
     </p:extLst>
   </p:cSld>

</xml_diff>